<commit_message>
add content about optimization
</commit_message>
<xml_diff>
--- a/微波谐振腔.pptx
+++ b/微波谐振腔.pptx
@@ -8,21 +8,22 @@
     <p:sldId id="256" r:id="rId2"/>
     <p:sldId id="257" r:id="rId3"/>
     <p:sldId id="269" r:id="rId4"/>
-    <p:sldId id="271" r:id="rId5"/>
-    <p:sldId id="261" r:id="rId6"/>
-    <p:sldId id="262" r:id="rId7"/>
-    <p:sldId id="259" r:id="rId8"/>
-    <p:sldId id="263" r:id="rId9"/>
-    <p:sldId id="266" r:id="rId10"/>
-    <p:sldId id="274" r:id="rId11"/>
-    <p:sldId id="264" r:id="rId12"/>
-    <p:sldId id="265" r:id="rId13"/>
-    <p:sldId id="275" r:id="rId14"/>
-    <p:sldId id="273" r:id="rId15"/>
-    <p:sldId id="276" r:id="rId16"/>
-    <p:sldId id="278" r:id="rId17"/>
-    <p:sldId id="268" r:id="rId18"/>
-    <p:sldId id="272" r:id="rId19"/>
+    <p:sldId id="279" r:id="rId5"/>
+    <p:sldId id="271" r:id="rId6"/>
+    <p:sldId id="261" r:id="rId7"/>
+    <p:sldId id="262" r:id="rId8"/>
+    <p:sldId id="259" r:id="rId9"/>
+    <p:sldId id="263" r:id="rId10"/>
+    <p:sldId id="266" r:id="rId11"/>
+    <p:sldId id="274" r:id="rId12"/>
+    <p:sldId id="264" r:id="rId13"/>
+    <p:sldId id="265" r:id="rId14"/>
+    <p:sldId id="275" r:id="rId15"/>
+    <p:sldId id="273" r:id="rId16"/>
+    <p:sldId id="276" r:id="rId17"/>
+    <p:sldId id="278" r:id="rId18"/>
+    <p:sldId id="268" r:id="rId19"/>
+    <p:sldId id="272" r:id="rId20"/>
   </p:sldIdLst>
   <p:sldSz cx="12192000" cy="6858000"/>
   <p:notesSz cx="6858000" cy="9144000"/>
@@ -3572,6 +3573,140 @@
           <a:p>
             <a:r>
               <a:rPr lang="zh-CN" altLang="en-US" dirty="0"/>
+              <a:t>求得介电常数实部绝对误差随介电常数变化</a:t>
+            </a:r>
+          </a:p>
+          <a:p>
+            <a:endParaRPr lang="zh-CN" altLang="en-US" dirty="0"/>
+          </a:p>
+        </p:txBody>
+      </p:sp>
+      <p:pic>
+        <p:nvPicPr>
+          <p:cNvPr id="5" name="图片 4">
+            <a:extLst>
+              <a:ext uri="{FF2B5EF4-FFF2-40B4-BE49-F238E27FC236}">
+                <a16:creationId xmlns:a16="http://schemas.microsoft.com/office/drawing/2014/main" id="{5C2B53C0-2122-48A4-B13A-5E5D22D8901E}"/>
+              </a:ext>
+            </a:extLst>
+          </p:cNvPr>
+          <p:cNvPicPr>
+            <a:picLocks noChangeAspect="1"/>
+          </p:cNvPicPr>
+          <p:nvPr/>
+        </p:nvPicPr>
+        <p:blipFill>
+          <a:blip r:embed="rId2"/>
+          <a:stretch>
+            <a:fillRect/>
+          </a:stretch>
+        </p:blipFill>
+        <p:spPr>
+          <a:xfrm>
+            <a:off x="310718" y="1529037"/>
+            <a:ext cx="10943149" cy="5040000"/>
+          </a:xfrm>
+          <a:prstGeom prst="rect">
+            <a:avLst/>
+          </a:prstGeom>
+        </p:spPr>
+      </p:pic>
+    </p:spTree>
+    <p:extLst>
+      <p:ext uri="{BB962C8B-B14F-4D97-AF65-F5344CB8AC3E}">
+        <p14:creationId xmlns:p14="http://schemas.microsoft.com/office/powerpoint/2010/main" val="592610939"/>
+      </p:ext>
+    </p:extLst>
+  </p:cSld>
+  <p:clrMapOvr>
+    <a:masterClrMapping/>
+  </p:clrMapOvr>
+</p:sld>
+</file>
+
+<file path=ppt/slides/slide11.xml><?xml version="1.0" encoding="utf-8"?>
+<p:sld xmlns:a="http://schemas.openxmlformats.org/drawingml/2006/main" xmlns:r="http://schemas.openxmlformats.org/officeDocument/2006/relationships" xmlns:p="http://schemas.openxmlformats.org/presentationml/2006/main">
+  <p:cSld>
+    <p:spTree>
+      <p:nvGrpSpPr>
+        <p:cNvPr id="1" name=""/>
+        <p:cNvGrpSpPr/>
+        <p:nvPr/>
+      </p:nvGrpSpPr>
+      <p:grpSpPr>
+        <a:xfrm>
+          <a:off x="0" y="0"/>
+          <a:ext cx="0" cy="0"/>
+          <a:chOff x="0" y="0"/>
+          <a:chExt cx="0" cy="0"/>
+        </a:xfrm>
+      </p:grpSpPr>
+      <p:sp>
+        <p:nvSpPr>
+          <p:cNvPr id="2" name="标题 1">
+            <a:extLst>
+              <a:ext uri="{FF2B5EF4-FFF2-40B4-BE49-F238E27FC236}">
+                <a16:creationId xmlns:a16="http://schemas.microsoft.com/office/drawing/2014/main" id="{01C96EAD-1CC4-4BED-B217-B0EC9792A025}"/>
+              </a:ext>
+            </a:extLst>
+          </p:cNvPr>
+          <p:cNvSpPr>
+            <a:spLocks noGrp="1"/>
+          </p:cNvSpPr>
+          <p:nvPr>
+            <p:ph type="title"/>
+          </p:nvPr>
+        </p:nvSpPr>
+        <p:spPr>
+          <a:xfrm>
+            <a:off x="838200" y="0"/>
+            <a:ext cx="10515600" cy="1325563"/>
+          </a:xfrm>
+        </p:spPr>
+        <p:txBody>
+          <a:bodyPr>
+            <a:normAutofit/>
+          </a:bodyPr>
+          <a:lstStyle/>
+          <a:p>
+            <a:r>
+              <a:rPr lang="zh-CN" altLang="en-US" sz="4000" b="1" dirty="0">
+                <a:latin typeface="楷体" panose="02010609060101010101" pitchFamily="49" charset="-122"/>
+                <a:ea typeface="楷体" panose="02010609060101010101" pitchFamily="49" charset="-122"/>
+              </a:rPr>
+              <a:t>介质参数求解误差分析</a:t>
+            </a:r>
+          </a:p>
+        </p:txBody>
+      </p:sp>
+      <p:sp>
+        <p:nvSpPr>
+          <p:cNvPr id="3" name="内容占位符 2">
+            <a:extLst>
+              <a:ext uri="{FF2B5EF4-FFF2-40B4-BE49-F238E27FC236}">
+                <a16:creationId xmlns:a16="http://schemas.microsoft.com/office/drawing/2014/main" id="{C7660EE8-3893-440E-9236-4B3C8EF73FE1}"/>
+              </a:ext>
+            </a:extLst>
+          </p:cNvPr>
+          <p:cNvSpPr>
+            <a:spLocks noGrp="1"/>
+          </p:cNvSpPr>
+          <p:nvPr>
+            <p:ph idx="1"/>
+          </p:nvPr>
+        </p:nvSpPr>
+        <p:spPr>
+          <a:xfrm>
+            <a:off x="838200" y="1253331"/>
+            <a:ext cx="10515600" cy="4351338"/>
+          </a:xfrm>
+        </p:spPr>
+        <p:txBody>
+          <a:bodyPr/>
+          <a:lstStyle/>
+          <a:p>
+            <a:r>
+              <a:rPr lang="zh-CN" altLang="en-US" dirty="0"/>
               <a:t>求得介电常数实部相对误差随介电常数变化</a:t>
             </a:r>
           </a:p>
@@ -3623,7 +3758,7 @@
 </p:sld>
 </file>
 
-<file path=ppt/slides/slide11.xml><?xml version="1.0" encoding="utf-8"?>
+<file path=ppt/slides/slide12.xml><?xml version="1.0" encoding="utf-8"?>
 <p:sld xmlns:a="http://schemas.openxmlformats.org/drawingml/2006/main" xmlns:r="http://schemas.openxmlformats.org/officeDocument/2006/relationships" xmlns:p="http://schemas.openxmlformats.org/presentationml/2006/main">
   <p:cSld>
     <p:bg>
@@ -3759,7 +3894,7 @@
 </p:sld>
 </file>
 
-<file path=ppt/slides/slide12.xml><?xml version="1.0" encoding="utf-8"?>
+<file path=ppt/slides/slide13.xml><?xml version="1.0" encoding="utf-8"?>
 <p:sld xmlns:a="http://schemas.openxmlformats.org/drawingml/2006/main" xmlns:r="http://schemas.openxmlformats.org/officeDocument/2006/relationships" xmlns:p="http://schemas.openxmlformats.org/presentationml/2006/main">
   <p:cSld>
     <p:bg>
@@ -3893,7 +4028,7 @@
 </p:sld>
 </file>
 
-<file path=ppt/slides/slide13.xml><?xml version="1.0" encoding="utf-8"?>
+<file path=ppt/slides/slide14.xml><?xml version="1.0" encoding="utf-8"?>
 <p:sld xmlns:a="http://schemas.openxmlformats.org/drawingml/2006/main" xmlns:r="http://schemas.openxmlformats.org/officeDocument/2006/relationships" xmlns:p="http://schemas.openxmlformats.org/presentationml/2006/main">
   <p:cSld>
     <p:bg>
@@ -4064,137 +4199,6 @@
 </p:sld>
 </file>
 
-<file path=ppt/slides/slide14.xml><?xml version="1.0" encoding="utf-8"?>
-<p:sld xmlns:a="http://schemas.openxmlformats.org/drawingml/2006/main" xmlns:r="http://schemas.openxmlformats.org/officeDocument/2006/relationships" xmlns:p="http://schemas.openxmlformats.org/presentationml/2006/main">
-  <p:cSld>
-    <p:spTree>
-      <p:nvGrpSpPr>
-        <p:cNvPr id="1" name=""/>
-        <p:cNvGrpSpPr/>
-        <p:nvPr/>
-      </p:nvGrpSpPr>
-      <p:grpSpPr>
-        <a:xfrm>
-          <a:off x="0" y="0"/>
-          <a:ext cx="0" cy="0"/>
-          <a:chOff x="0" y="0"/>
-          <a:chExt cx="0" cy="0"/>
-        </a:xfrm>
-      </p:grpSpPr>
-      <p:sp>
-        <p:nvSpPr>
-          <p:cNvPr id="2" name="标题 1">
-            <a:extLst>
-              <a:ext uri="{FF2B5EF4-FFF2-40B4-BE49-F238E27FC236}">
-                <a16:creationId xmlns:a16="http://schemas.microsoft.com/office/drawing/2014/main" id="{5C7FB163-DF39-4671-9B17-CAD430E46F87}"/>
-              </a:ext>
-            </a:extLst>
-          </p:cNvPr>
-          <p:cNvSpPr>
-            <a:spLocks noGrp="1"/>
-          </p:cNvSpPr>
-          <p:nvPr>
-            <p:ph type="title"/>
-          </p:nvPr>
-        </p:nvSpPr>
-        <p:spPr>
-          <a:xfrm>
-            <a:off x="838200" y="0"/>
-            <a:ext cx="10515600" cy="1325563"/>
-          </a:xfrm>
-        </p:spPr>
-        <p:txBody>
-          <a:bodyPr>
-            <a:normAutofit/>
-          </a:bodyPr>
-          <a:lstStyle/>
-          <a:p>
-            <a:r>
-              <a:rPr lang="zh-CN" altLang="en-US" sz="4000" b="1" dirty="0">
-                <a:latin typeface="楷体" panose="02010609060101010101" pitchFamily="49" charset="-122"/>
-                <a:ea typeface="楷体" panose="02010609060101010101" pitchFamily="49" charset="-122"/>
-              </a:rPr>
-              <a:t>介质参数求解误差分析</a:t>
-            </a:r>
-          </a:p>
-        </p:txBody>
-      </p:sp>
-      <p:sp>
-        <p:nvSpPr>
-          <p:cNvPr id="3" name="内容占位符 2">
-            <a:extLst>
-              <a:ext uri="{FF2B5EF4-FFF2-40B4-BE49-F238E27FC236}">
-                <a16:creationId xmlns:a16="http://schemas.microsoft.com/office/drawing/2014/main" id="{972DC4F2-AD9D-4716-9998-9D2346420414}"/>
-              </a:ext>
-            </a:extLst>
-          </p:cNvPr>
-          <p:cNvSpPr>
-            <a:spLocks noGrp="1"/>
-          </p:cNvSpPr>
-          <p:nvPr>
-            <p:ph idx="1"/>
-          </p:nvPr>
-        </p:nvSpPr>
-        <p:spPr>
-          <a:xfrm>
-            <a:off x="838200" y="1253331"/>
-            <a:ext cx="10515600" cy="4351338"/>
-          </a:xfrm>
-        </p:spPr>
-        <p:txBody>
-          <a:bodyPr/>
-          <a:lstStyle/>
-          <a:p>
-            <a:r>
-              <a:rPr lang="zh-CN" altLang="en-US" dirty="0"/>
-              <a:t>求得损耗角正切绝对误差随损耗角正切变化</a:t>
-            </a:r>
-          </a:p>
-        </p:txBody>
-      </p:sp>
-      <p:pic>
-        <p:nvPicPr>
-          <p:cNvPr id="6" name="图片 5">
-            <a:extLst>
-              <a:ext uri="{FF2B5EF4-FFF2-40B4-BE49-F238E27FC236}">
-                <a16:creationId xmlns:a16="http://schemas.microsoft.com/office/drawing/2014/main" id="{E36470FB-2C3F-448B-A902-9958DA7E7C82}"/>
-              </a:ext>
-            </a:extLst>
-          </p:cNvPr>
-          <p:cNvPicPr>
-            <a:picLocks noChangeAspect="1"/>
-          </p:cNvPicPr>
-          <p:nvPr/>
-        </p:nvPicPr>
-        <p:blipFill>
-          <a:blip r:embed="rId2"/>
-          <a:stretch>
-            <a:fillRect/>
-          </a:stretch>
-        </p:blipFill>
-        <p:spPr>
-          <a:xfrm>
-            <a:off x="309600" y="1530000"/>
-            <a:ext cx="10943150" cy="5040000"/>
-          </a:xfrm>
-          <a:prstGeom prst="rect">
-            <a:avLst/>
-          </a:prstGeom>
-        </p:spPr>
-      </p:pic>
-    </p:spTree>
-    <p:extLst>
-      <p:ext uri="{BB962C8B-B14F-4D97-AF65-F5344CB8AC3E}">
-        <p14:creationId xmlns:p14="http://schemas.microsoft.com/office/powerpoint/2010/main" val="2694430483"/>
-      </p:ext>
-    </p:extLst>
-  </p:cSld>
-  <p:clrMapOvr>
-    <a:masterClrMapping/>
-  </p:clrMapOvr>
-</p:sld>
-</file>
-
 <file path=ppt/slides/slide15.xml><?xml version="1.0" encoding="utf-8"?>
 <p:sld xmlns:a="http://schemas.openxmlformats.org/drawingml/2006/main" xmlns:r="http://schemas.openxmlformats.org/officeDocument/2006/relationships" xmlns:p="http://schemas.openxmlformats.org/presentationml/2006/main">
   <p:cSld>
@@ -4278,17 +4282,17 @@
           <a:p>
             <a:r>
               <a:rPr lang="zh-CN" altLang="en-US" dirty="0"/>
-              <a:t>求得损耗角正切相对误差随损耗角正切变化</a:t>
+              <a:t>求得损耗角正切绝对误差随损耗角正切变化</a:t>
             </a:r>
           </a:p>
         </p:txBody>
       </p:sp>
       <p:pic>
         <p:nvPicPr>
-          <p:cNvPr id="5" name="图片 4">
+          <p:cNvPr id="6" name="图片 5">
             <a:extLst>
               <a:ext uri="{FF2B5EF4-FFF2-40B4-BE49-F238E27FC236}">
-                <a16:creationId xmlns:a16="http://schemas.microsoft.com/office/drawing/2014/main" id="{FAEE7DA0-47E8-4A14-8A65-C4B340FD38D7}"/>
+                <a16:creationId xmlns:a16="http://schemas.microsoft.com/office/drawing/2014/main" id="{E36470FB-2C3F-448B-A902-9958DA7E7C82}"/>
               </a:ext>
             </a:extLst>
           </p:cNvPr>
@@ -4316,7 +4320,7 @@
     </p:spTree>
     <p:extLst>
       <p:ext uri="{BB962C8B-B14F-4D97-AF65-F5344CB8AC3E}">
-        <p14:creationId xmlns:p14="http://schemas.microsoft.com/office/powerpoint/2010/main" val="2364606816"/>
+        <p14:creationId xmlns:p14="http://schemas.microsoft.com/office/powerpoint/2010/main" val="2694430483"/>
       </p:ext>
     </p:extLst>
   </p:cSld>
@@ -4409,6 +4413,137 @@
           <a:p>
             <a:r>
               <a:rPr lang="zh-CN" altLang="en-US" dirty="0"/>
+              <a:t>求得损耗角正切相对误差随损耗角正切变化</a:t>
+            </a:r>
+          </a:p>
+        </p:txBody>
+      </p:sp>
+      <p:pic>
+        <p:nvPicPr>
+          <p:cNvPr id="5" name="图片 4">
+            <a:extLst>
+              <a:ext uri="{FF2B5EF4-FFF2-40B4-BE49-F238E27FC236}">
+                <a16:creationId xmlns:a16="http://schemas.microsoft.com/office/drawing/2014/main" id="{FAEE7DA0-47E8-4A14-8A65-C4B340FD38D7}"/>
+              </a:ext>
+            </a:extLst>
+          </p:cNvPr>
+          <p:cNvPicPr>
+            <a:picLocks noChangeAspect="1"/>
+          </p:cNvPicPr>
+          <p:nvPr/>
+        </p:nvPicPr>
+        <p:blipFill>
+          <a:blip r:embed="rId2"/>
+          <a:stretch>
+            <a:fillRect/>
+          </a:stretch>
+        </p:blipFill>
+        <p:spPr>
+          <a:xfrm>
+            <a:off x="309600" y="1530000"/>
+            <a:ext cx="10943150" cy="5040000"/>
+          </a:xfrm>
+          <a:prstGeom prst="rect">
+            <a:avLst/>
+          </a:prstGeom>
+        </p:spPr>
+      </p:pic>
+    </p:spTree>
+    <p:extLst>
+      <p:ext uri="{BB962C8B-B14F-4D97-AF65-F5344CB8AC3E}">
+        <p14:creationId xmlns:p14="http://schemas.microsoft.com/office/powerpoint/2010/main" val="2364606816"/>
+      </p:ext>
+    </p:extLst>
+  </p:cSld>
+  <p:clrMapOvr>
+    <a:masterClrMapping/>
+  </p:clrMapOvr>
+</p:sld>
+</file>
+
+<file path=ppt/slides/slide17.xml><?xml version="1.0" encoding="utf-8"?>
+<p:sld xmlns:a="http://schemas.openxmlformats.org/drawingml/2006/main" xmlns:r="http://schemas.openxmlformats.org/officeDocument/2006/relationships" xmlns:p="http://schemas.openxmlformats.org/presentationml/2006/main">
+  <p:cSld>
+    <p:spTree>
+      <p:nvGrpSpPr>
+        <p:cNvPr id="1" name=""/>
+        <p:cNvGrpSpPr/>
+        <p:nvPr/>
+      </p:nvGrpSpPr>
+      <p:grpSpPr>
+        <a:xfrm>
+          <a:off x="0" y="0"/>
+          <a:ext cx="0" cy="0"/>
+          <a:chOff x="0" y="0"/>
+          <a:chExt cx="0" cy="0"/>
+        </a:xfrm>
+      </p:grpSpPr>
+      <p:sp>
+        <p:nvSpPr>
+          <p:cNvPr id="2" name="标题 1">
+            <a:extLst>
+              <a:ext uri="{FF2B5EF4-FFF2-40B4-BE49-F238E27FC236}">
+                <a16:creationId xmlns:a16="http://schemas.microsoft.com/office/drawing/2014/main" id="{5C7FB163-DF39-4671-9B17-CAD430E46F87}"/>
+              </a:ext>
+            </a:extLst>
+          </p:cNvPr>
+          <p:cNvSpPr>
+            <a:spLocks noGrp="1"/>
+          </p:cNvSpPr>
+          <p:nvPr>
+            <p:ph type="title"/>
+          </p:nvPr>
+        </p:nvSpPr>
+        <p:spPr>
+          <a:xfrm>
+            <a:off x="838200" y="0"/>
+            <a:ext cx="10515600" cy="1325563"/>
+          </a:xfrm>
+        </p:spPr>
+        <p:txBody>
+          <a:bodyPr>
+            <a:normAutofit/>
+          </a:bodyPr>
+          <a:lstStyle/>
+          <a:p>
+            <a:r>
+              <a:rPr lang="zh-CN" altLang="en-US" sz="4000" b="1" dirty="0">
+                <a:latin typeface="楷体" panose="02010609060101010101" pitchFamily="49" charset="-122"/>
+                <a:ea typeface="楷体" panose="02010609060101010101" pitchFamily="49" charset="-122"/>
+              </a:rPr>
+              <a:t>介质参数求解误差分析</a:t>
+            </a:r>
+          </a:p>
+        </p:txBody>
+      </p:sp>
+      <p:sp>
+        <p:nvSpPr>
+          <p:cNvPr id="3" name="内容占位符 2">
+            <a:extLst>
+              <a:ext uri="{FF2B5EF4-FFF2-40B4-BE49-F238E27FC236}">
+                <a16:creationId xmlns:a16="http://schemas.microsoft.com/office/drawing/2014/main" id="{972DC4F2-AD9D-4716-9998-9D2346420414}"/>
+              </a:ext>
+            </a:extLst>
+          </p:cNvPr>
+          <p:cNvSpPr>
+            <a:spLocks noGrp="1"/>
+          </p:cNvSpPr>
+          <p:nvPr>
+            <p:ph idx="1"/>
+          </p:nvPr>
+        </p:nvSpPr>
+        <p:spPr>
+          <a:xfrm>
+            <a:off x="838200" y="1253331"/>
+            <a:ext cx="10515600" cy="4351338"/>
+          </a:xfrm>
+        </p:spPr>
+        <p:txBody>
+          <a:bodyPr/>
+          <a:lstStyle/>
+          <a:p>
+            <a:r>
+              <a:rPr lang="zh-CN" altLang="en-US" dirty="0"/>
               <a:t>不同损耗的介质对损耗角正切求解精度的影响</a:t>
             </a:r>
             <a:endParaRPr lang="en-US" altLang="zh-CN" dirty="0"/>
@@ -4531,7 +4666,7 @@
 </p:sld>
 </file>
 
-<file path=ppt/slides/slide17.xml><?xml version="1.0" encoding="utf-8"?>
+<file path=ppt/slides/slide18.xml><?xml version="1.0" encoding="utf-8"?>
 <p:sld xmlns:a="http://schemas.openxmlformats.org/drawingml/2006/main" xmlns:r="http://schemas.openxmlformats.org/officeDocument/2006/relationships" xmlns:p="http://schemas.openxmlformats.org/presentationml/2006/main">
   <p:cSld>
     <p:spTree>
@@ -8021,7 +8156,7 @@
 </p:sld>
 </file>
 
-<file path=ppt/slides/slide18.xml><?xml version="1.0" encoding="utf-8"?>
+<file path=ppt/slides/slide19.xml><?xml version="1.0" encoding="utf-8"?>
 <p:sld xmlns:a="http://schemas.openxmlformats.org/drawingml/2006/main" xmlns:r="http://schemas.openxmlformats.org/officeDocument/2006/relationships" xmlns:p="http://schemas.openxmlformats.org/presentationml/2006/main">
   <p:cSld>
     <p:spTree>
@@ -9729,7 +9864,7 @@
                     <a:latin typeface="Times New Roman" panose="02020603050405020304" pitchFamily="18" charset="0"/>
                     <a:ea typeface="宋体" panose="02010600030101010101" pitchFamily="2" charset="-122"/>
                   </a:rPr>
-                  <a:t>	Q = 8637</a:t>
+                  <a:t>	Q = 8633</a:t>
                 </a:r>
                 <a:endParaRPr lang="zh-CN" altLang="en-US" sz="2000" dirty="0">
                   <a:latin typeface="Times New Roman" panose="02020603050405020304" pitchFamily="18" charset="0"/>
@@ -10167,6 +10302,866 @@
           </a:p>
         </p:txBody>
       </p:sp>
+      <p:sp>
+        <p:nvSpPr>
+          <p:cNvPr id="4" name="内容占位符 3">
+            <a:extLst>
+              <a:ext uri="{FF2B5EF4-FFF2-40B4-BE49-F238E27FC236}">
+                <a16:creationId xmlns:a16="http://schemas.microsoft.com/office/drawing/2014/main" id="{EA641940-FE06-4EF0-B82C-9836AB1F6C24}"/>
+              </a:ext>
+            </a:extLst>
+          </p:cNvPr>
+          <p:cNvSpPr>
+            <a:spLocks noGrp="1"/>
+          </p:cNvSpPr>
+          <p:nvPr>
+            <p:ph idx="1"/>
+          </p:nvPr>
+        </p:nvSpPr>
+        <p:spPr>
+          <a:xfrm>
+            <a:off x="838200" y="1192279"/>
+            <a:ext cx="7039062" cy="5033237"/>
+          </a:xfrm>
+          <a:prstGeom prst="rect">
+            <a:avLst/>
+          </a:prstGeom>
+        </p:spPr>
+        <p:txBody>
+          <a:bodyPr wrap="square">
+            <a:spAutoFit/>
+          </a:bodyPr>
+          <a:lstStyle/>
+          <a:p>
+            <a:pPr marL="0" indent="0">
+              <a:buNone/>
+            </a:pPr>
+            <a:r>
+              <a:rPr lang="zh-CN" altLang="en-US" sz="2000" kern="100" dirty="0">
+                <a:latin typeface="Times New Roman" panose="02020603050405020304" pitchFamily="18" charset="0"/>
+                <a:ea typeface="宋体" panose="02010600030101010101" pitchFamily="2" charset="-122"/>
+                <a:cs typeface="Times New Roman" panose="02020603050405020304" pitchFamily="18" charset="0"/>
+              </a:rPr>
+              <a:t>优化后</a:t>
+            </a:r>
+            <a:r>
+              <a:rPr lang="zh-CN" altLang="en-US" sz="2000" kern="100" dirty="0">
+                <a:solidFill>
+                  <a:schemeClr val="tx1"/>
+                </a:solidFill>
+                <a:latin typeface="Times New Roman" panose="02020603050405020304" pitchFamily="18" charset="0"/>
+                <a:ea typeface="宋体" panose="02010600030101010101" pitchFamily="2" charset="-122"/>
+                <a:cs typeface="Times New Roman" panose="02020603050405020304" pitchFamily="18" charset="0"/>
+              </a:rPr>
+              <a:t>仿真得</a:t>
+            </a:r>
+            <a:endParaRPr lang="en-US" altLang="zh-CN" sz="2000" dirty="0">
+              <a:solidFill>
+                <a:schemeClr val="tx1"/>
+              </a:solidFill>
+              <a:latin typeface="Times New Roman" panose="02020603050405020304" pitchFamily="18" charset="0"/>
+              <a:ea typeface="宋体" panose="02010600030101010101" pitchFamily="2" charset="-122"/>
+            </a:endParaRPr>
+          </a:p>
+          <a:p>
+            <a:pPr marL="0" indent="0">
+              <a:lnSpc>
+                <a:spcPct val="150000"/>
+              </a:lnSpc>
+              <a:buNone/>
+            </a:pPr>
+            <a:r>
+              <a:rPr lang="en-US" altLang="zh-CN" sz="2000" dirty="0">
+                <a:latin typeface="Times New Roman" panose="02020603050405020304" pitchFamily="18" charset="0"/>
+                <a:ea typeface="宋体" panose="02010600030101010101" pitchFamily="2" charset="-122"/>
+              </a:rPr>
+              <a:t>1. </a:t>
+            </a:r>
+            <a:r>
+              <a:rPr lang="zh-CN" altLang="en-US" sz="2000" dirty="0">
+                <a:latin typeface="Times New Roman" panose="02020603050405020304" pitchFamily="18" charset="0"/>
+                <a:ea typeface="宋体" panose="02010600030101010101" pitchFamily="2" charset="-122"/>
+              </a:rPr>
+              <a:t>谐振频率</a:t>
+            </a:r>
+            <a:r>
+              <a:rPr lang="en-US" altLang="zh-CN" sz="2000" dirty="0">
+                <a:latin typeface="Times New Roman" panose="02020603050405020304" pitchFamily="18" charset="0"/>
+                <a:ea typeface="宋体" panose="02010600030101010101" pitchFamily="2" charset="-122"/>
+              </a:rPr>
+              <a:t>		F  = 16.163 GHz</a:t>
+            </a:r>
+          </a:p>
+          <a:p>
+            <a:pPr marL="0" indent="0">
+              <a:lnSpc>
+                <a:spcPct val="150000"/>
+              </a:lnSpc>
+              <a:buNone/>
+            </a:pPr>
+            <a:r>
+              <a:rPr lang="en-US" altLang="zh-CN" sz="2000" dirty="0">
+                <a:latin typeface="Times New Roman" panose="02020603050405020304" pitchFamily="18" charset="0"/>
+                <a:ea typeface="宋体" panose="02010600030101010101" pitchFamily="2" charset="-122"/>
+              </a:rPr>
+              <a:t>2. </a:t>
+            </a:r>
+            <a:r>
+              <a:rPr lang="zh-CN" altLang="en-US" sz="2000" dirty="0">
+                <a:latin typeface="Times New Roman" panose="02020603050405020304" pitchFamily="18" charset="0"/>
+                <a:ea typeface="宋体" panose="02010600030101010101" pitchFamily="2" charset="-122"/>
+              </a:rPr>
+              <a:t>无载品质因数 </a:t>
+            </a:r>
+            <a:r>
+              <a:rPr lang="en-US" altLang="zh-CN" sz="2000" dirty="0">
+                <a:latin typeface="Times New Roman" panose="02020603050405020304" pitchFamily="18" charset="0"/>
+                <a:ea typeface="宋体" panose="02010600030101010101" pitchFamily="2" charset="-122"/>
+              </a:rPr>
+              <a:t>	Q = 8637</a:t>
+            </a:r>
+          </a:p>
+          <a:p>
+            <a:pPr marL="0" indent="0">
+              <a:lnSpc>
+                <a:spcPct val="150000"/>
+              </a:lnSpc>
+              <a:buNone/>
+            </a:pPr>
+            <a:r>
+              <a:rPr lang="zh-CN" altLang="en-US" sz="2000" dirty="0">
+                <a:latin typeface="Times New Roman" panose="02020603050405020304" pitchFamily="18" charset="0"/>
+                <a:ea typeface="宋体" panose="02010600030101010101" pitchFamily="2" charset="-122"/>
+              </a:rPr>
+              <a:t>优化后尺寸</a:t>
+            </a:r>
+            <a:endParaRPr lang="en-US" altLang="zh-CN" sz="2000" dirty="0">
+              <a:latin typeface="Times New Roman" panose="02020603050405020304" pitchFamily="18" charset="0"/>
+              <a:ea typeface="宋体" panose="02010600030101010101" pitchFamily="2" charset="-122"/>
+            </a:endParaRPr>
+          </a:p>
+          <a:p>
+            <a:pPr marL="0" indent="0">
+              <a:lnSpc>
+                <a:spcPct val="150000"/>
+              </a:lnSpc>
+              <a:buNone/>
+            </a:pPr>
+            <a:r>
+              <a:rPr lang="en-US" altLang="zh-CN" sz="2000" kern="100" dirty="0">
+                <a:latin typeface="Times New Roman" panose="02020603050405020304" pitchFamily="18" charset="0"/>
+                <a:ea typeface="宋体" panose="02010600030101010101" pitchFamily="2" charset="-122"/>
+                <a:cs typeface="Times New Roman" panose="02020603050405020304" pitchFamily="18" charset="0"/>
+              </a:rPr>
+              <a:t>a	=	22.825mm</a:t>
+            </a:r>
+          </a:p>
+          <a:p>
+            <a:pPr marL="0" indent="0">
+              <a:lnSpc>
+                <a:spcPct val="150000"/>
+              </a:lnSpc>
+              <a:buNone/>
+            </a:pPr>
+            <a:r>
+              <a:rPr lang="en-US" altLang="zh-CN" sz="2000" kern="100" dirty="0">
+                <a:latin typeface="Times New Roman" panose="02020603050405020304" pitchFamily="18" charset="0"/>
+                <a:ea typeface="宋体" panose="02010600030101010101" pitchFamily="2" charset="-122"/>
+                <a:cs typeface="Times New Roman" panose="02020603050405020304" pitchFamily="18" charset="0"/>
+              </a:rPr>
+              <a:t>b	=	10.160mm</a:t>
+            </a:r>
+          </a:p>
+          <a:p>
+            <a:pPr marL="0" indent="0">
+              <a:lnSpc>
+                <a:spcPct val="150000"/>
+              </a:lnSpc>
+              <a:buNone/>
+            </a:pPr>
+            <a:r>
+              <a:rPr lang="en-US" altLang="zh-CN" sz="2000" kern="100" dirty="0">
+                <a:latin typeface="Times New Roman" panose="02020603050405020304" pitchFamily="18" charset="0"/>
+                <a:ea typeface="宋体" panose="02010600030101010101" pitchFamily="2" charset="-122"/>
+                <a:cs typeface="Times New Roman" panose="02020603050405020304" pitchFamily="18" charset="0"/>
+              </a:rPr>
+              <a:t>l	=	22.860mm</a:t>
+            </a:r>
+          </a:p>
+          <a:p>
+            <a:pPr marL="0" indent="0">
+              <a:lnSpc>
+                <a:spcPct val="150000"/>
+              </a:lnSpc>
+              <a:buNone/>
+            </a:pPr>
+            <a:r>
+              <a:rPr lang="zh-CN" altLang="en-US" sz="2000" kern="100" dirty="0">
+                <a:latin typeface="Times New Roman" panose="02020603050405020304" pitchFamily="18" charset="0"/>
+                <a:ea typeface="宋体" panose="02010600030101010101" pitchFamily="2" charset="-122"/>
+                <a:cs typeface="Times New Roman" panose="02020603050405020304" pitchFamily="18" charset="0"/>
+              </a:rPr>
+              <a:t>加入微扰</a:t>
+            </a:r>
+            <a:endParaRPr lang="en-US" altLang="zh-CN" sz="2000" kern="100" dirty="0">
+              <a:latin typeface="Times New Roman" panose="02020603050405020304" pitchFamily="18" charset="0"/>
+              <a:ea typeface="宋体" panose="02010600030101010101" pitchFamily="2" charset="-122"/>
+              <a:cs typeface="Times New Roman" panose="02020603050405020304" pitchFamily="18" charset="0"/>
+            </a:endParaRPr>
+          </a:p>
+          <a:p>
+            <a:pPr marL="0" indent="0">
+              <a:lnSpc>
+                <a:spcPct val="150000"/>
+              </a:lnSpc>
+              <a:buNone/>
+            </a:pPr>
+            <a:r>
+              <a:rPr lang="en-US" altLang="zh-CN" sz="2000" dirty="0">
+                <a:latin typeface="Times New Roman" panose="02020603050405020304" pitchFamily="18" charset="0"/>
+                <a:ea typeface="宋体" panose="02010600030101010101" pitchFamily="2" charset="-122"/>
+              </a:rPr>
+              <a:t>XOY</a:t>
+            </a:r>
+            <a:r>
+              <a:rPr lang="zh-CN" altLang="en-US" sz="2000" dirty="0">
+                <a:latin typeface="Times New Roman" panose="02020603050405020304" pitchFamily="18" charset="0"/>
+                <a:ea typeface="宋体" panose="02010600030101010101" pitchFamily="2" charset="-122"/>
+              </a:rPr>
+              <a:t>平面中心处放入介质圆柱</a:t>
+            </a:r>
+          </a:p>
+        </p:txBody>
+      </p:sp>
+      <p:sp>
+        <p:nvSpPr>
+          <p:cNvPr id="5" name="内容占位符 2">
+            <a:extLst>
+              <a:ext uri="{FF2B5EF4-FFF2-40B4-BE49-F238E27FC236}">
+                <a16:creationId xmlns:a16="http://schemas.microsoft.com/office/drawing/2014/main" id="{6C613FF5-53B7-43E6-B9BF-436C5753D248}"/>
+              </a:ext>
+            </a:extLst>
+          </p:cNvPr>
+          <p:cNvSpPr txBox="1">
+            <a:spLocks/>
+          </p:cNvSpPr>
+          <p:nvPr/>
+        </p:nvSpPr>
+        <p:spPr>
+          <a:xfrm>
+            <a:off x="6481893" y="1192279"/>
+            <a:ext cx="6267276" cy="2310860"/>
+          </a:xfrm>
+          <a:prstGeom prst="rect">
+            <a:avLst/>
+          </a:prstGeom>
+        </p:spPr>
+        <p:txBody>
+          <a:bodyPr vert="horz" lIns="91440" tIns="45720" rIns="91440" bIns="45720" rtlCol="0">
+            <a:normAutofit/>
+          </a:bodyPr>
+          <a:lstStyle>
+            <a:lvl1pPr marL="228600" indent="-228600" algn="l" defTabSz="914400" rtl="0" eaLnBrk="1" latinLnBrk="0" hangingPunct="1">
+              <a:lnSpc>
+                <a:spcPct val="90000"/>
+              </a:lnSpc>
+              <a:spcBef>
+                <a:spcPts val="1000"/>
+              </a:spcBef>
+              <a:buFont typeface="Arial" panose="020B0604020202020204" pitchFamily="34" charset="0"/>
+              <a:buChar char="•"/>
+              <a:defRPr sz="2800" kern="1200">
+                <a:solidFill>
+                  <a:schemeClr val="tx1"/>
+                </a:solidFill>
+                <a:latin typeface="+mn-lt"/>
+                <a:ea typeface="+mn-ea"/>
+                <a:cs typeface="+mn-cs"/>
+              </a:defRPr>
+            </a:lvl1pPr>
+            <a:lvl2pPr marL="685800" indent="-228600" algn="l" defTabSz="914400" rtl="0" eaLnBrk="1" latinLnBrk="0" hangingPunct="1">
+              <a:lnSpc>
+                <a:spcPct val="90000"/>
+              </a:lnSpc>
+              <a:spcBef>
+                <a:spcPts val="500"/>
+              </a:spcBef>
+              <a:buFont typeface="Arial" panose="020B0604020202020204" pitchFamily="34" charset="0"/>
+              <a:buChar char="•"/>
+              <a:defRPr sz="2400" kern="1200">
+                <a:solidFill>
+                  <a:schemeClr val="tx1"/>
+                </a:solidFill>
+                <a:latin typeface="+mn-lt"/>
+                <a:ea typeface="+mn-ea"/>
+                <a:cs typeface="+mn-cs"/>
+              </a:defRPr>
+            </a:lvl2pPr>
+            <a:lvl3pPr marL="1143000" indent="-228600" algn="l" defTabSz="914400" rtl="0" eaLnBrk="1" latinLnBrk="0" hangingPunct="1">
+              <a:lnSpc>
+                <a:spcPct val="90000"/>
+              </a:lnSpc>
+              <a:spcBef>
+                <a:spcPts val="500"/>
+              </a:spcBef>
+              <a:buFont typeface="Arial" panose="020B0604020202020204" pitchFamily="34" charset="0"/>
+              <a:buChar char="•"/>
+              <a:defRPr sz="2000" kern="1200">
+                <a:solidFill>
+                  <a:schemeClr val="tx1"/>
+                </a:solidFill>
+                <a:latin typeface="+mn-lt"/>
+                <a:ea typeface="+mn-ea"/>
+                <a:cs typeface="+mn-cs"/>
+              </a:defRPr>
+            </a:lvl3pPr>
+            <a:lvl4pPr marL="1600200" indent="-228600" algn="l" defTabSz="914400" rtl="0" eaLnBrk="1" latinLnBrk="0" hangingPunct="1">
+              <a:lnSpc>
+                <a:spcPct val="90000"/>
+              </a:lnSpc>
+              <a:spcBef>
+                <a:spcPts val="500"/>
+              </a:spcBef>
+              <a:buFont typeface="Arial" panose="020B0604020202020204" pitchFamily="34" charset="0"/>
+              <a:buChar char="•"/>
+              <a:defRPr sz="1800" kern="1200">
+                <a:solidFill>
+                  <a:schemeClr val="tx1"/>
+                </a:solidFill>
+                <a:latin typeface="+mn-lt"/>
+                <a:ea typeface="+mn-ea"/>
+                <a:cs typeface="+mn-cs"/>
+              </a:defRPr>
+            </a:lvl4pPr>
+            <a:lvl5pPr marL="2057400" indent="-228600" algn="l" defTabSz="914400" rtl="0" eaLnBrk="1" latinLnBrk="0" hangingPunct="1">
+              <a:lnSpc>
+                <a:spcPct val="90000"/>
+              </a:lnSpc>
+              <a:spcBef>
+                <a:spcPts val="500"/>
+              </a:spcBef>
+              <a:buFont typeface="Arial" panose="020B0604020202020204" pitchFamily="34" charset="0"/>
+              <a:buChar char="•"/>
+              <a:defRPr sz="1800" kern="1200">
+                <a:solidFill>
+                  <a:schemeClr val="tx1"/>
+                </a:solidFill>
+                <a:latin typeface="+mn-lt"/>
+                <a:ea typeface="+mn-ea"/>
+                <a:cs typeface="+mn-cs"/>
+              </a:defRPr>
+            </a:lvl5pPr>
+            <a:lvl6pPr marL="2514600" indent="-228600" algn="l" defTabSz="914400" rtl="0" eaLnBrk="1" latinLnBrk="0" hangingPunct="1">
+              <a:lnSpc>
+                <a:spcPct val="90000"/>
+              </a:lnSpc>
+              <a:spcBef>
+                <a:spcPts val="500"/>
+              </a:spcBef>
+              <a:buFont typeface="Arial" panose="020B0604020202020204" pitchFamily="34" charset="0"/>
+              <a:buChar char="•"/>
+              <a:defRPr sz="1800" kern="1200">
+                <a:solidFill>
+                  <a:schemeClr val="tx1"/>
+                </a:solidFill>
+                <a:latin typeface="+mn-lt"/>
+                <a:ea typeface="+mn-ea"/>
+                <a:cs typeface="+mn-cs"/>
+              </a:defRPr>
+            </a:lvl6pPr>
+            <a:lvl7pPr marL="2971800" indent="-228600" algn="l" defTabSz="914400" rtl="0" eaLnBrk="1" latinLnBrk="0" hangingPunct="1">
+              <a:lnSpc>
+                <a:spcPct val="90000"/>
+              </a:lnSpc>
+              <a:spcBef>
+                <a:spcPts val="500"/>
+              </a:spcBef>
+              <a:buFont typeface="Arial" panose="020B0604020202020204" pitchFamily="34" charset="0"/>
+              <a:buChar char="•"/>
+              <a:defRPr sz="1800" kern="1200">
+                <a:solidFill>
+                  <a:schemeClr val="tx1"/>
+                </a:solidFill>
+                <a:latin typeface="+mn-lt"/>
+                <a:ea typeface="+mn-ea"/>
+                <a:cs typeface="+mn-cs"/>
+              </a:defRPr>
+            </a:lvl7pPr>
+            <a:lvl8pPr marL="3429000" indent="-228600" algn="l" defTabSz="914400" rtl="0" eaLnBrk="1" latinLnBrk="0" hangingPunct="1">
+              <a:lnSpc>
+                <a:spcPct val="90000"/>
+              </a:lnSpc>
+              <a:spcBef>
+                <a:spcPts val="500"/>
+              </a:spcBef>
+              <a:buFont typeface="Arial" panose="020B0604020202020204" pitchFamily="34" charset="0"/>
+              <a:buChar char="•"/>
+              <a:defRPr sz="1800" kern="1200">
+                <a:solidFill>
+                  <a:schemeClr val="tx1"/>
+                </a:solidFill>
+                <a:latin typeface="+mn-lt"/>
+                <a:ea typeface="+mn-ea"/>
+                <a:cs typeface="+mn-cs"/>
+              </a:defRPr>
+            </a:lvl8pPr>
+            <a:lvl9pPr marL="3886200" indent="-228600" algn="l" defTabSz="914400" rtl="0" eaLnBrk="1" latinLnBrk="0" hangingPunct="1">
+              <a:lnSpc>
+                <a:spcPct val="90000"/>
+              </a:lnSpc>
+              <a:spcBef>
+                <a:spcPts val="500"/>
+              </a:spcBef>
+              <a:buFont typeface="Arial" panose="020B0604020202020204" pitchFamily="34" charset="0"/>
+              <a:buChar char="•"/>
+              <a:defRPr sz="1800" kern="1200">
+                <a:solidFill>
+                  <a:schemeClr val="tx1"/>
+                </a:solidFill>
+                <a:latin typeface="+mn-lt"/>
+                <a:ea typeface="+mn-ea"/>
+                <a:cs typeface="+mn-cs"/>
+              </a:defRPr>
+            </a:lvl9pPr>
+          </a:lstStyle>
+          <a:p>
+            <a:pPr marL="228600" marR="0" lvl="0" indent="-228600" algn="l" defTabSz="914400" rtl="0" eaLnBrk="1" fontAlgn="auto" latinLnBrk="0" hangingPunct="1">
+              <a:lnSpc>
+                <a:spcPct val="150000"/>
+              </a:lnSpc>
+              <a:spcBef>
+                <a:spcPts val="1000"/>
+              </a:spcBef>
+              <a:spcAft>
+                <a:spcPts val="0"/>
+              </a:spcAft>
+              <a:buClrTx/>
+              <a:buSzTx/>
+              <a:buFont typeface="Arial" panose="020B0604020202020204" pitchFamily="34" charset="0"/>
+              <a:buChar char="•"/>
+              <a:tabLst/>
+              <a:defRPr/>
+            </a:pPr>
+            <a:r>
+              <a:rPr kumimoji="0" lang="zh-CN" altLang="en-US" sz="2000" b="0" i="0" u="none" strike="noStrike" kern="1200" cap="none" spc="0" normalizeH="0" baseline="0" noProof="0" dirty="0">
+                <a:ln>
+                  <a:noFill/>
+                </a:ln>
+                <a:solidFill>
+                  <a:prstClr val="black"/>
+                </a:solidFill>
+                <a:effectLst/>
+                <a:uLnTx/>
+                <a:uFillTx/>
+                <a:latin typeface="仿宋" panose="02010609060101010101" pitchFamily="49" charset="-122"/>
+                <a:ea typeface="仿宋" panose="02010609060101010101" pitchFamily="49" charset="-122"/>
+                <a:cs typeface="+mn-cs"/>
+              </a:rPr>
+              <a:t>腔体结构 铜制矩形谐振腔</a:t>
+            </a:r>
+            <a:endParaRPr kumimoji="0" lang="en-US" altLang="zh-CN" sz="2000" b="0" i="0" u="none" strike="noStrike" kern="1200" cap="none" spc="0" normalizeH="0" baseline="0" noProof="0" dirty="0">
+              <a:ln>
+                <a:noFill/>
+              </a:ln>
+              <a:solidFill>
+                <a:prstClr val="black"/>
+              </a:solidFill>
+              <a:effectLst/>
+              <a:uLnTx/>
+              <a:uFillTx/>
+              <a:latin typeface="仿宋" panose="02010609060101010101" pitchFamily="49" charset="-122"/>
+              <a:ea typeface="仿宋" panose="02010609060101010101" pitchFamily="49" charset="-122"/>
+              <a:cs typeface="+mn-cs"/>
+            </a:endParaRPr>
+          </a:p>
+          <a:p>
+            <a:pPr marL="228600" marR="0" lvl="0" indent="-228600" algn="l" defTabSz="914400" rtl="0" eaLnBrk="1" fontAlgn="auto" latinLnBrk="0" hangingPunct="1">
+              <a:lnSpc>
+                <a:spcPct val="150000"/>
+              </a:lnSpc>
+              <a:spcBef>
+                <a:spcPts val="1000"/>
+              </a:spcBef>
+              <a:spcAft>
+                <a:spcPts val="0"/>
+              </a:spcAft>
+              <a:buClrTx/>
+              <a:buSzTx/>
+              <a:buFont typeface="Arial" panose="020B0604020202020204" pitchFamily="34" charset="0"/>
+              <a:buChar char="•"/>
+              <a:tabLst/>
+              <a:defRPr/>
+            </a:pPr>
+            <a:r>
+              <a:rPr kumimoji="0" lang="zh-CN" altLang="en-US" sz="2000" b="0" i="0" u="none" strike="noStrike" kern="1200" cap="none" spc="0" normalizeH="0" baseline="0" noProof="0" dirty="0">
+                <a:ln>
+                  <a:noFill/>
+                </a:ln>
+                <a:solidFill>
+                  <a:prstClr val="black"/>
+                </a:solidFill>
+                <a:effectLst/>
+                <a:uLnTx/>
+                <a:uFillTx/>
+                <a:latin typeface="仿宋" panose="02010609060101010101" pitchFamily="49" charset="-122"/>
+                <a:ea typeface="仿宋" panose="02010609060101010101" pitchFamily="49" charset="-122"/>
+                <a:cs typeface="+mn-cs"/>
+              </a:rPr>
+              <a:t>激励方式 同轴线探针激励</a:t>
+            </a:r>
+            <a:endParaRPr kumimoji="0" lang="en-US" altLang="zh-CN" sz="2000" b="0" i="0" u="none" strike="noStrike" kern="1200" cap="none" spc="0" normalizeH="0" baseline="0" noProof="0" dirty="0">
+              <a:ln>
+                <a:noFill/>
+              </a:ln>
+              <a:solidFill>
+                <a:prstClr val="black"/>
+              </a:solidFill>
+              <a:effectLst/>
+              <a:uLnTx/>
+              <a:uFillTx/>
+              <a:latin typeface="仿宋" panose="02010609060101010101" pitchFamily="49" charset="-122"/>
+              <a:ea typeface="仿宋" panose="02010609060101010101" pitchFamily="49" charset="-122"/>
+              <a:cs typeface="+mn-cs"/>
+            </a:endParaRPr>
+          </a:p>
+          <a:p>
+            <a:pPr marL="228600" marR="0" lvl="0" indent="-228600" algn="l" defTabSz="914400" rtl="0" eaLnBrk="1" fontAlgn="auto" latinLnBrk="0" hangingPunct="1">
+              <a:lnSpc>
+                <a:spcPct val="150000"/>
+              </a:lnSpc>
+              <a:spcBef>
+                <a:spcPts val="1000"/>
+              </a:spcBef>
+              <a:spcAft>
+                <a:spcPts val="0"/>
+              </a:spcAft>
+              <a:buClrTx/>
+              <a:buSzTx/>
+              <a:buFont typeface="Arial" panose="020B0604020202020204" pitchFamily="34" charset="0"/>
+              <a:buChar char="•"/>
+              <a:tabLst/>
+              <a:defRPr/>
+            </a:pPr>
+            <a:r>
+              <a:rPr kumimoji="0" lang="zh-CN" altLang="en-US" sz="2000" b="0" i="0" u="none" strike="noStrike" kern="1200" cap="none" spc="0" normalizeH="0" baseline="0" noProof="0" dirty="0">
+                <a:ln>
+                  <a:noFill/>
+                </a:ln>
+                <a:solidFill>
+                  <a:prstClr val="black"/>
+                </a:solidFill>
+                <a:effectLst/>
+                <a:uLnTx/>
+                <a:uFillTx/>
+                <a:latin typeface="仿宋" panose="02010609060101010101" pitchFamily="49" charset="-122"/>
+                <a:ea typeface="仿宋" panose="02010609060101010101" pitchFamily="49" charset="-122"/>
+                <a:cs typeface="+mn-cs"/>
+              </a:rPr>
+              <a:t>设计谐振频率：</a:t>
+            </a:r>
+            <a:r>
+              <a:rPr kumimoji="0" lang="en-US" altLang="zh-CN" sz="2000" b="0" i="0" u="none" strike="noStrike" kern="1200" cap="none" spc="0" normalizeH="0" baseline="0" noProof="0" dirty="0">
+                <a:ln>
+                  <a:noFill/>
+                </a:ln>
+                <a:solidFill>
+                  <a:prstClr val="black"/>
+                </a:solidFill>
+                <a:effectLst/>
+                <a:uLnTx/>
+                <a:uFillTx/>
+                <a:latin typeface="仿宋" panose="02010609060101010101" pitchFamily="49" charset="-122"/>
+                <a:ea typeface="仿宋" panose="02010609060101010101" pitchFamily="49" charset="-122"/>
+                <a:cs typeface="+mn-cs"/>
+              </a:rPr>
+              <a:t>16.16GHz</a:t>
+            </a:r>
+          </a:p>
+          <a:p>
+            <a:pPr marL="228600" marR="0" lvl="0" indent="-228600" algn="l" defTabSz="914400" rtl="0" eaLnBrk="1" fontAlgn="auto" latinLnBrk="0" hangingPunct="1">
+              <a:lnSpc>
+                <a:spcPct val="150000"/>
+              </a:lnSpc>
+              <a:spcBef>
+                <a:spcPts val="1000"/>
+              </a:spcBef>
+              <a:spcAft>
+                <a:spcPts val="0"/>
+              </a:spcAft>
+              <a:buClrTx/>
+              <a:buSzTx/>
+              <a:buFont typeface="Arial" panose="020B0604020202020204" pitchFamily="34" charset="0"/>
+              <a:buChar char="•"/>
+              <a:tabLst/>
+              <a:defRPr/>
+            </a:pPr>
+            <a:r>
+              <a:rPr kumimoji="0" lang="zh-CN" altLang="en-US" sz="2000" b="0" i="0" u="none" strike="noStrike" kern="1200" cap="none" spc="0" normalizeH="0" baseline="0" noProof="0" dirty="0">
+                <a:ln>
+                  <a:noFill/>
+                </a:ln>
+                <a:solidFill>
+                  <a:prstClr val="black"/>
+                </a:solidFill>
+                <a:effectLst/>
+                <a:uLnTx/>
+                <a:uFillTx/>
+                <a:latin typeface="仿宋" panose="02010609060101010101" pitchFamily="49" charset="-122"/>
+                <a:ea typeface="仿宋" panose="02010609060101010101" pitchFamily="49" charset="-122"/>
+                <a:cs typeface="+mn-cs"/>
+              </a:rPr>
+              <a:t>工作模式：</a:t>
+            </a:r>
+            <a:r>
+              <a:rPr kumimoji="0" lang="en-US" altLang="zh-CN" sz="2000" b="0" i="0" u="none" strike="noStrike" kern="1200" cap="none" spc="0" normalizeH="0" baseline="0" noProof="0" dirty="0">
+                <a:ln>
+                  <a:noFill/>
+                </a:ln>
+                <a:solidFill>
+                  <a:prstClr val="black"/>
+                </a:solidFill>
+                <a:effectLst/>
+                <a:uLnTx/>
+                <a:uFillTx/>
+                <a:latin typeface="仿宋" panose="02010609060101010101" pitchFamily="49" charset="-122"/>
+                <a:ea typeface="仿宋" panose="02010609060101010101" pitchFamily="49" charset="-122"/>
+                <a:cs typeface="+mn-cs"/>
+              </a:rPr>
+              <a:t>TM110</a:t>
+            </a:r>
+          </a:p>
+          <a:p>
+            <a:pPr marL="228600" marR="0" lvl="0" indent="-228600" algn="l" defTabSz="914400" rtl="0" eaLnBrk="1" fontAlgn="auto" latinLnBrk="0" hangingPunct="1">
+              <a:lnSpc>
+                <a:spcPct val="90000"/>
+              </a:lnSpc>
+              <a:spcBef>
+                <a:spcPts val="1000"/>
+              </a:spcBef>
+              <a:spcAft>
+                <a:spcPts val="0"/>
+              </a:spcAft>
+              <a:buClrTx/>
+              <a:buSzTx/>
+              <a:buFont typeface="Arial" panose="020B0604020202020204" pitchFamily="34" charset="0"/>
+              <a:buChar char="•"/>
+              <a:tabLst/>
+              <a:defRPr/>
+            </a:pPr>
+            <a:endParaRPr kumimoji="0" lang="en-US" altLang="zh-CN" sz="2000" b="0" i="0" u="none" strike="noStrike" kern="1200" cap="none" spc="0" normalizeH="0" baseline="0" noProof="0" dirty="0">
+              <a:ln>
+                <a:noFill/>
+              </a:ln>
+              <a:solidFill>
+                <a:prstClr val="black"/>
+              </a:solidFill>
+              <a:effectLst/>
+              <a:uLnTx/>
+              <a:uFillTx/>
+              <a:latin typeface="等线" panose="020F0502020204030204"/>
+              <a:ea typeface="等线" panose="02010600030101010101" pitchFamily="2" charset="-122"/>
+              <a:cs typeface="+mn-cs"/>
+            </a:endParaRPr>
+          </a:p>
+          <a:p>
+            <a:pPr marL="228600" marR="0" lvl="0" indent="-228600" algn="l" defTabSz="914400" rtl="0" eaLnBrk="1" fontAlgn="auto" latinLnBrk="0" hangingPunct="1">
+              <a:lnSpc>
+                <a:spcPct val="90000"/>
+              </a:lnSpc>
+              <a:spcBef>
+                <a:spcPts val="1000"/>
+              </a:spcBef>
+              <a:spcAft>
+                <a:spcPts val="0"/>
+              </a:spcAft>
+              <a:buClrTx/>
+              <a:buSzTx/>
+              <a:buFont typeface="Arial" panose="020B0604020202020204" pitchFamily="34" charset="0"/>
+              <a:buChar char="•"/>
+              <a:tabLst/>
+              <a:defRPr/>
+            </a:pPr>
+            <a:endParaRPr kumimoji="0" lang="en-US" altLang="zh-CN" sz="2000" b="0" i="0" u="none" strike="noStrike" kern="1200" cap="none" spc="0" normalizeH="0" baseline="0" noProof="0" dirty="0">
+              <a:ln>
+                <a:noFill/>
+              </a:ln>
+              <a:solidFill>
+                <a:prstClr val="black"/>
+              </a:solidFill>
+              <a:effectLst/>
+              <a:uLnTx/>
+              <a:uFillTx/>
+              <a:latin typeface="等线" panose="020F0502020204030204"/>
+              <a:ea typeface="等线" panose="02010600030101010101" pitchFamily="2" charset="-122"/>
+              <a:cs typeface="+mn-cs"/>
+            </a:endParaRPr>
+          </a:p>
+          <a:p>
+            <a:pPr marL="228600" marR="0" lvl="0" indent="-228600" algn="l" defTabSz="914400" rtl="0" eaLnBrk="1" fontAlgn="auto" latinLnBrk="0" hangingPunct="1">
+              <a:lnSpc>
+                <a:spcPct val="90000"/>
+              </a:lnSpc>
+              <a:spcBef>
+                <a:spcPts val="1000"/>
+              </a:spcBef>
+              <a:spcAft>
+                <a:spcPts val="0"/>
+              </a:spcAft>
+              <a:buClrTx/>
+              <a:buSzTx/>
+              <a:buFont typeface="Arial" panose="020B0604020202020204" pitchFamily="34" charset="0"/>
+              <a:buChar char="•"/>
+              <a:tabLst/>
+              <a:defRPr/>
+            </a:pPr>
+            <a:endParaRPr kumimoji="0" lang="en-US" altLang="zh-CN" sz="2000" b="0" i="0" u="none" strike="noStrike" kern="1200" cap="none" spc="0" normalizeH="0" baseline="0" noProof="0" dirty="0">
+              <a:ln>
+                <a:noFill/>
+              </a:ln>
+              <a:solidFill>
+                <a:prstClr val="black"/>
+              </a:solidFill>
+              <a:effectLst/>
+              <a:uLnTx/>
+              <a:uFillTx/>
+              <a:latin typeface="等线" panose="020F0502020204030204"/>
+              <a:ea typeface="等线" panose="02010600030101010101" pitchFamily="2" charset="-122"/>
+              <a:cs typeface="+mn-cs"/>
+            </a:endParaRPr>
+          </a:p>
+          <a:p>
+            <a:pPr marL="228600" marR="0" lvl="0" indent="-228600" algn="l" defTabSz="914400" rtl="0" eaLnBrk="1" fontAlgn="auto" latinLnBrk="0" hangingPunct="1">
+              <a:lnSpc>
+                <a:spcPct val="90000"/>
+              </a:lnSpc>
+              <a:spcBef>
+                <a:spcPts val="1000"/>
+              </a:spcBef>
+              <a:spcAft>
+                <a:spcPts val="0"/>
+              </a:spcAft>
+              <a:buClrTx/>
+              <a:buSzTx/>
+              <a:buFont typeface="Arial" panose="020B0604020202020204" pitchFamily="34" charset="0"/>
+              <a:buChar char="•"/>
+              <a:tabLst/>
+              <a:defRPr/>
+            </a:pPr>
+            <a:endParaRPr kumimoji="0" lang="zh-CN" altLang="en-US" sz="2000" b="0" i="0" u="none" strike="noStrike" kern="1200" cap="none" spc="0" normalizeH="0" baseline="0" noProof="0" dirty="0">
+              <a:ln>
+                <a:noFill/>
+              </a:ln>
+              <a:solidFill>
+                <a:prstClr val="black"/>
+              </a:solidFill>
+              <a:effectLst/>
+              <a:uLnTx/>
+              <a:uFillTx/>
+              <a:latin typeface="等线" panose="020F0502020204030204"/>
+              <a:ea typeface="等线" panose="02010600030101010101" pitchFamily="2" charset="-122"/>
+              <a:cs typeface="+mn-cs"/>
+            </a:endParaRPr>
+          </a:p>
+        </p:txBody>
+      </p:sp>
+      <p:pic>
+        <p:nvPicPr>
+          <p:cNvPr id="6" name="图片 5">
+            <a:extLst>
+              <a:ext uri="{FF2B5EF4-FFF2-40B4-BE49-F238E27FC236}">
+                <a16:creationId xmlns:a16="http://schemas.microsoft.com/office/drawing/2014/main" id="{EE600726-A284-43B7-B07C-1FE1F44D2D38}"/>
+              </a:ext>
+            </a:extLst>
+          </p:cNvPr>
+          <p:cNvPicPr>
+            <a:picLocks noChangeAspect="1"/>
+          </p:cNvPicPr>
+          <p:nvPr/>
+        </p:nvPicPr>
+        <p:blipFill>
+          <a:blip r:embed="rId2"/>
+          <a:stretch>
+            <a:fillRect/>
+          </a:stretch>
+        </p:blipFill>
+        <p:spPr>
+          <a:xfrm>
+            <a:off x="6481893" y="3481397"/>
+            <a:ext cx="5137569" cy="3288682"/>
+          </a:xfrm>
+          <a:prstGeom prst="rect">
+            <a:avLst/>
+          </a:prstGeom>
+        </p:spPr>
+      </p:pic>
+    </p:spTree>
+    <p:extLst>
+      <p:ext uri="{BB962C8B-B14F-4D97-AF65-F5344CB8AC3E}">
+        <p14:creationId xmlns:p14="http://schemas.microsoft.com/office/powerpoint/2010/main" val="562200327"/>
+      </p:ext>
+    </p:extLst>
+  </p:cSld>
+  <p:clrMapOvr>
+    <a:masterClrMapping/>
+  </p:clrMapOvr>
+</p:sld>
+</file>
+
+<file path=ppt/slides/slide5.xml><?xml version="1.0" encoding="utf-8"?>
+<p:sld xmlns:a="http://schemas.openxmlformats.org/drawingml/2006/main" xmlns:r="http://schemas.openxmlformats.org/officeDocument/2006/relationships" xmlns:p="http://schemas.openxmlformats.org/presentationml/2006/main">
+  <p:cSld>
+    <p:spTree>
+      <p:nvGrpSpPr>
+        <p:cNvPr id="1" name=""/>
+        <p:cNvGrpSpPr/>
+        <p:nvPr/>
+      </p:nvGrpSpPr>
+      <p:grpSpPr>
+        <a:xfrm>
+          <a:off x="0" y="0"/>
+          <a:ext cx="0" cy="0"/>
+          <a:chOff x="0" y="0"/>
+          <a:chExt cx="0" cy="0"/>
+        </a:xfrm>
+      </p:grpSpPr>
+      <p:sp>
+        <p:nvSpPr>
+          <p:cNvPr id="2" name="标题 1">
+            <a:extLst>
+              <a:ext uri="{FF2B5EF4-FFF2-40B4-BE49-F238E27FC236}">
+                <a16:creationId xmlns:a16="http://schemas.microsoft.com/office/drawing/2014/main" id="{ECE721D9-7744-4AE9-9A7A-2EA0F7B29C12}"/>
+              </a:ext>
+            </a:extLst>
+          </p:cNvPr>
+          <p:cNvSpPr>
+            <a:spLocks noGrp="1"/>
+          </p:cNvSpPr>
+          <p:nvPr>
+            <p:ph type="title"/>
+          </p:nvPr>
+        </p:nvSpPr>
+        <p:spPr>
+          <a:xfrm>
+            <a:off x="838200" y="0"/>
+            <a:ext cx="10515600" cy="1325563"/>
+          </a:xfrm>
+        </p:spPr>
+        <p:txBody>
+          <a:bodyPr>
+            <a:normAutofit/>
+          </a:bodyPr>
+          <a:lstStyle/>
+          <a:p>
+            <a:r>
+              <a:rPr lang="zh-CN" altLang="en-US" sz="4000" b="1" dirty="0">
+                <a:latin typeface="楷体" panose="02010609060101010101" pitchFamily="49" charset="-122"/>
+                <a:ea typeface="楷体" panose="02010609060101010101" pitchFamily="49" charset="-122"/>
+              </a:rPr>
+              <a:t>谐振腔设计</a:t>
+            </a:r>
+          </a:p>
+        </p:txBody>
+      </p:sp>
       <p:pic>
         <p:nvPicPr>
           <p:cNvPr id="9" name="图片 8">
@@ -10513,7 +11508,7 @@
 </p:sld>
 </file>
 
-<file path=ppt/slides/slide5.xml><?xml version="1.0" encoding="utf-8"?>
+<file path=ppt/slides/slide6.xml><?xml version="1.0" encoding="utf-8"?>
 <p:sld xmlns:a="http://schemas.openxmlformats.org/drawingml/2006/main" xmlns:r="http://schemas.openxmlformats.org/officeDocument/2006/relationships" xmlns:p="http://schemas.openxmlformats.org/presentationml/2006/main">
   <p:cSld>
     <p:spTree>
@@ -10867,7 +11862,7 @@
 </p:sld>
 </file>
 
-<file path=ppt/slides/slide6.xml><?xml version="1.0" encoding="utf-8"?>
+<file path=ppt/slides/slide7.xml><?xml version="1.0" encoding="utf-8"?>
 <p:sld xmlns:a="http://schemas.openxmlformats.org/drawingml/2006/main" xmlns:r="http://schemas.openxmlformats.org/officeDocument/2006/relationships" xmlns:p="http://schemas.openxmlformats.org/presentationml/2006/main">
   <p:cSld>
     <p:spTree>
@@ -12656,7 +13651,7 @@
 </p:sld>
 </file>
 
-<file path=ppt/slides/slide7.xml><?xml version="1.0" encoding="utf-8"?>
+<file path=ppt/slides/slide8.xml><?xml version="1.0" encoding="utf-8"?>
 <p:sld xmlns:a="http://schemas.openxmlformats.org/drawingml/2006/main" xmlns:r="http://schemas.openxmlformats.org/officeDocument/2006/relationships" xmlns:p="http://schemas.openxmlformats.org/presentationml/2006/main">
   <p:cSld>
     <p:spTree>
@@ -14528,7 +15523,7 @@
 </p:sld>
 </file>
 
-<file path=ppt/slides/slide8.xml><?xml version="1.0" encoding="utf-8"?>
+<file path=ppt/slides/slide9.xml><?xml version="1.0" encoding="utf-8"?>
 <p:sld xmlns:a="http://schemas.openxmlformats.org/drawingml/2006/main" xmlns:r="http://schemas.openxmlformats.org/officeDocument/2006/relationships" xmlns:p="http://schemas.openxmlformats.org/presentationml/2006/main">
   <p:cSld>
     <p:spTree>
@@ -14650,140 +15645,6 @@
     <p:extLst>
       <p:ext uri="{BB962C8B-B14F-4D97-AF65-F5344CB8AC3E}">
         <p14:creationId xmlns:p14="http://schemas.microsoft.com/office/powerpoint/2010/main" val="1109113317"/>
-      </p:ext>
-    </p:extLst>
-  </p:cSld>
-  <p:clrMapOvr>
-    <a:masterClrMapping/>
-  </p:clrMapOvr>
-</p:sld>
-</file>
-
-<file path=ppt/slides/slide9.xml><?xml version="1.0" encoding="utf-8"?>
-<p:sld xmlns:a="http://schemas.openxmlformats.org/drawingml/2006/main" xmlns:r="http://schemas.openxmlformats.org/officeDocument/2006/relationships" xmlns:p="http://schemas.openxmlformats.org/presentationml/2006/main">
-  <p:cSld>
-    <p:spTree>
-      <p:nvGrpSpPr>
-        <p:cNvPr id="1" name=""/>
-        <p:cNvGrpSpPr/>
-        <p:nvPr/>
-      </p:nvGrpSpPr>
-      <p:grpSpPr>
-        <a:xfrm>
-          <a:off x="0" y="0"/>
-          <a:ext cx="0" cy="0"/>
-          <a:chOff x="0" y="0"/>
-          <a:chExt cx="0" cy="0"/>
-        </a:xfrm>
-      </p:grpSpPr>
-      <p:sp>
-        <p:nvSpPr>
-          <p:cNvPr id="2" name="标题 1">
-            <a:extLst>
-              <a:ext uri="{FF2B5EF4-FFF2-40B4-BE49-F238E27FC236}">
-                <a16:creationId xmlns:a16="http://schemas.microsoft.com/office/drawing/2014/main" id="{01C96EAD-1CC4-4BED-B217-B0EC9792A025}"/>
-              </a:ext>
-            </a:extLst>
-          </p:cNvPr>
-          <p:cNvSpPr>
-            <a:spLocks noGrp="1"/>
-          </p:cNvSpPr>
-          <p:nvPr>
-            <p:ph type="title"/>
-          </p:nvPr>
-        </p:nvSpPr>
-        <p:spPr>
-          <a:xfrm>
-            <a:off x="838200" y="0"/>
-            <a:ext cx="10515600" cy="1325563"/>
-          </a:xfrm>
-        </p:spPr>
-        <p:txBody>
-          <a:bodyPr>
-            <a:normAutofit/>
-          </a:bodyPr>
-          <a:lstStyle/>
-          <a:p>
-            <a:r>
-              <a:rPr lang="zh-CN" altLang="en-US" sz="4000" b="1" dirty="0">
-                <a:latin typeface="楷体" panose="02010609060101010101" pitchFamily="49" charset="-122"/>
-                <a:ea typeface="楷体" panose="02010609060101010101" pitchFamily="49" charset="-122"/>
-              </a:rPr>
-              <a:t>介质参数求解误差分析</a:t>
-            </a:r>
-          </a:p>
-        </p:txBody>
-      </p:sp>
-      <p:sp>
-        <p:nvSpPr>
-          <p:cNvPr id="3" name="内容占位符 2">
-            <a:extLst>
-              <a:ext uri="{FF2B5EF4-FFF2-40B4-BE49-F238E27FC236}">
-                <a16:creationId xmlns:a16="http://schemas.microsoft.com/office/drawing/2014/main" id="{C7660EE8-3893-440E-9236-4B3C8EF73FE1}"/>
-              </a:ext>
-            </a:extLst>
-          </p:cNvPr>
-          <p:cNvSpPr>
-            <a:spLocks noGrp="1"/>
-          </p:cNvSpPr>
-          <p:nvPr>
-            <p:ph idx="1"/>
-          </p:nvPr>
-        </p:nvSpPr>
-        <p:spPr>
-          <a:xfrm>
-            <a:off x="838200" y="1253331"/>
-            <a:ext cx="10515600" cy="4351338"/>
-          </a:xfrm>
-        </p:spPr>
-        <p:txBody>
-          <a:bodyPr/>
-          <a:lstStyle/>
-          <a:p>
-            <a:r>
-              <a:rPr lang="zh-CN" altLang="en-US" dirty="0"/>
-              <a:t>求得介电常数实部绝对误差随介电常数变化</a:t>
-            </a:r>
-          </a:p>
-          <a:p>
-            <a:endParaRPr lang="zh-CN" altLang="en-US" dirty="0"/>
-          </a:p>
-        </p:txBody>
-      </p:sp>
-      <p:pic>
-        <p:nvPicPr>
-          <p:cNvPr id="5" name="图片 4">
-            <a:extLst>
-              <a:ext uri="{FF2B5EF4-FFF2-40B4-BE49-F238E27FC236}">
-                <a16:creationId xmlns:a16="http://schemas.microsoft.com/office/drawing/2014/main" id="{5C2B53C0-2122-48A4-B13A-5E5D22D8901E}"/>
-              </a:ext>
-            </a:extLst>
-          </p:cNvPr>
-          <p:cNvPicPr>
-            <a:picLocks noChangeAspect="1"/>
-          </p:cNvPicPr>
-          <p:nvPr/>
-        </p:nvPicPr>
-        <p:blipFill>
-          <a:blip r:embed="rId2"/>
-          <a:stretch>
-            <a:fillRect/>
-          </a:stretch>
-        </p:blipFill>
-        <p:spPr>
-          <a:xfrm>
-            <a:off x="310718" y="1529037"/>
-            <a:ext cx="10943149" cy="5040000"/>
-          </a:xfrm>
-          <a:prstGeom prst="rect">
-            <a:avLst/>
-          </a:prstGeom>
-        </p:spPr>
-      </p:pic>
-    </p:spTree>
-    <p:extLst>
-      <p:ext uri="{BB962C8B-B14F-4D97-AF65-F5344CB8AC3E}">
-        <p14:creationId xmlns:p14="http://schemas.microsoft.com/office/powerpoint/2010/main" val="592610939"/>
       </p:ext>
     </p:extLst>
   </p:cSld>

</xml_diff>

<commit_message>
change the symbol of dielectrical constant
</commit_message>
<xml_diff>
--- a/微波谐振腔.pptx
+++ b/微波谐振腔.pptx
@@ -4719,8 +4719,8 @@
           </a:p>
         </p:txBody>
       </p:sp>
-      <mc:AlternateContent xmlns:mc="http://schemas.openxmlformats.org/markup-compatibility/2006" xmlns:a14="http://schemas.microsoft.com/office/drawing/2010/main">
-        <mc:Choice Requires="a14">
+      <mc:AlternateContent xmlns:mc="http://schemas.openxmlformats.org/markup-compatibility/2006">
+        <mc:Choice xmlns:a14="http://schemas.microsoft.com/office/drawing/2010/main" Requires="a14">
           <p:sp>
             <p:nvSpPr>
               <p:cNvPr id="3" name="内容占位符 2">
@@ -4988,7 +4988,10 @@
                             <m:t>(△</m:t>
                           </m:r>
                           <m:r>
-                            <a:rPr lang="en-US" altLang="zh-CN" sz="2500" i="1" kern="100">
+                            <m:rPr>
+                              <m:sty m:val="p"/>
+                            </m:rPr>
+                            <a:rPr lang="el-GR" altLang="zh-CN" sz="2500" i="1" kern="100" smtClean="0">
                               <a:solidFill>
                                 <a:schemeClr val="tx1"/>
                               </a:solidFill>
@@ -4996,7 +4999,7 @@
                               <a:ea typeface="宋体" panose="02010600030101010101" pitchFamily="2" charset="-122"/>
                               <a:cs typeface="Times New Roman" panose="02020603050405020304" pitchFamily="18" charset="0"/>
                             </a:rPr>
-                            <m:t>𝜖</m:t>
+                            <m:t>ε</m:t>
                           </m:r>
                           <m:r>
                             <a:rPr lang="en-US" altLang="zh-CN" sz="2500" i="1" kern="100">
@@ -5279,7 +5282,10 @@
                                 <m:t>(</m:t>
                               </m:r>
                               <m:r>
-                                <a:rPr lang="en-US" altLang="zh-CN" sz="2500" i="1" kern="100">
+                                <m:rPr>
+                                  <m:sty m:val="p"/>
+                                </m:rPr>
+                                <a:rPr lang="el-GR" altLang="zh-CN" sz="2500" i="1" kern="100" smtClean="0">
                                   <a:solidFill>
                                     <a:schemeClr val="tx1"/>
                                   </a:solidFill>
@@ -5287,7 +5293,7 @@
                                   <a:ea typeface="宋体" panose="02010600030101010101" pitchFamily="2" charset="-122"/>
                                   <a:cs typeface="Times New Roman" panose="02020603050405020304" pitchFamily="18" charset="0"/>
                                 </a:rPr>
-                                <m:t>𝜖</m:t>
+                                <m:t>ε</m:t>
                               </m:r>
                               <m:sSup>
                                 <m:sSupPr>
@@ -5668,7 +5674,10 @@
                       <m:t>△</m:t>
                     </m:r>
                     <m:r>
-                      <a:rPr lang="en-US" altLang="zh-CN" sz="2500" i="1" kern="100">
+                      <m:rPr>
+                        <m:sty m:val="p"/>
+                      </m:rPr>
+                      <a:rPr lang="el-GR" altLang="zh-CN" sz="2500" i="1" kern="100" smtClean="0">
                         <a:solidFill>
                           <a:schemeClr val="tx1"/>
                         </a:solidFill>
@@ -5676,7 +5685,7 @@
                         <a:ea typeface="宋体" panose="02010600030101010101" pitchFamily="2" charset="-122"/>
                         <a:cs typeface="Times New Roman" panose="02020603050405020304" pitchFamily="18" charset="0"/>
                       </a:rPr>
-                      <m:t>𝜖</m:t>
+                      <m:t>ε</m:t>
                     </m:r>
                     <m:r>
                       <a:rPr lang="en-US" altLang="zh-CN" sz="2500" i="1" kern="100">
@@ -5704,7 +5713,10 @@
                       </m:sSubPr>
                       <m:e>
                         <m:r>
-                          <a:rPr lang="en-US" altLang="zh-CN" sz="2500" i="1" kern="100">
+                          <m:rPr>
+                            <m:sty m:val="p"/>
+                          </m:rPr>
+                          <a:rPr lang="el-GR" altLang="zh-CN" sz="2500" i="1" kern="100" smtClean="0">
                             <a:solidFill>
                               <a:schemeClr val="tx1"/>
                             </a:solidFill>
@@ -5712,7 +5724,7 @@
                             <a:ea typeface="宋体" panose="02010600030101010101" pitchFamily="2" charset="-122"/>
                             <a:cs typeface="Times New Roman" panose="02020603050405020304" pitchFamily="18" charset="0"/>
                           </a:rPr>
-                          <m:t>𝜖</m:t>
+                          <m:t>ε</m:t>
                         </m:r>
                       </m:e>
                       <m:sub>
@@ -5755,7 +5767,10 @@
                       </m:sSubPr>
                       <m:e>
                         <m:r>
-                          <a:rPr lang="en-US" altLang="zh-CN" sz="2500" i="1" kern="100">
+                          <m:rPr>
+                            <m:sty m:val="p"/>
+                          </m:rPr>
+                          <a:rPr lang="el-GR" altLang="zh-CN" sz="2500" i="1" kern="100" smtClean="0">
                             <a:solidFill>
                               <a:schemeClr val="tx1"/>
                             </a:solidFill>
@@ -5763,7 +5778,7 @@
                             <a:ea typeface="宋体" panose="02010600030101010101" pitchFamily="2" charset="-122"/>
                             <a:cs typeface="Times New Roman" panose="02020603050405020304" pitchFamily="18" charset="0"/>
                           </a:rPr>
-                          <m:t>𝜖</m:t>
+                          <m:t>ε</m:t>
                         </m:r>
                       </m:e>
                       <m:sub>
@@ -6023,7 +6038,10 @@
                                 </m:sSubPr>
                                 <m:e>
                                   <m:r>
-                                    <a:rPr lang="en-US" altLang="zh-CN" sz="2500" i="1" kern="100">
+                                    <m:rPr>
+                                      <m:sty m:val="p"/>
+                                    </m:rPr>
+                                    <a:rPr lang="el-GR" altLang="zh-CN" sz="2500" i="1" kern="100" smtClean="0">
                                       <a:solidFill>
                                         <a:schemeClr val="tx1"/>
                                       </a:solidFill>
@@ -6031,7 +6049,7 @@
                                       <a:ea typeface="宋体" panose="02010600030101010101" pitchFamily="2" charset="-122"/>
                                       <a:cs typeface="Times New Roman" panose="02020603050405020304" pitchFamily="18" charset="0"/>
                                     </a:rPr>
-                                    <m:t>𝜖</m:t>
+                                    <m:t>ε</m:t>
                                   </m:r>
                                 </m:e>
                                 <m:sub>
@@ -6074,7 +6092,10 @@
                                 </m:sSubPr>
                                 <m:e>
                                   <m:r>
-                                    <a:rPr lang="en-US" altLang="zh-CN" sz="2500" i="1" kern="100">
+                                    <m:rPr>
+                                      <m:sty m:val="p"/>
+                                    </m:rPr>
+                                    <a:rPr lang="el-GR" altLang="zh-CN" sz="2500" i="1" kern="100" smtClean="0">
                                       <a:solidFill>
                                         <a:schemeClr val="tx1"/>
                                       </a:solidFill>
@@ -6082,7 +6103,7 @@
                                       <a:ea typeface="宋体" panose="02010600030101010101" pitchFamily="2" charset="-122"/>
                                       <a:cs typeface="Times New Roman" panose="02020603050405020304" pitchFamily="18" charset="0"/>
                                     </a:rPr>
-                                    <m:t>𝜖</m:t>
+                                    <m:t>ε</m:t>
                                   </m:r>
                                 </m:e>
                                 <m:sub>
@@ -6279,7 +6300,10 @@
                                 </m:sSubPr>
                                 <m:e>
                                   <m:r>
-                                    <a:rPr lang="en-US" altLang="zh-CN" sz="2500" i="1" kern="100">
+                                    <m:rPr>
+                                      <m:sty m:val="p"/>
+                                    </m:rPr>
+                                    <a:rPr lang="el-GR" altLang="zh-CN" sz="2500" i="1" kern="100" smtClean="0">
                                       <a:solidFill>
                                         <a:schemeClr val="tx1"/>
                                       </a:solidFill>
@@ -6287,7 +6311,7 @@
                                       <a:ea typeface="宋体" panose="02010600030101010101" pitchFamily="2" charset="-122"/>
                                       <a:cs typeface="Times New Roman" panose="02020603050405020304" pitchFamily="18" charset="0"/>
                                     </a:rPr>
-                                    <m:t>𝜖</m:t>
+                                    <m:t>ε</m:t>
                                   </m:r>
                                 </m:e>
                                 <m:sub>
@@ -6522,7 +6546,10 @@
                       </m:sSubPr>
                       <m:e>
                         <m:r>
-                          <a:rPr lang="en-US" altLang="zh-CN" sz="2500" i="1" kern="100">
+                          <m:rPr>
+                            <m:sty m:val="p"/>
+                          </m:rPr>
+                          <a:rPr lang="el-GR" altLang="zh-CN" sz="2500" i="1" kern="100" smtClean="0">
                             <a:solidFill>
                               <a:schemeClr val="tx1"/>
                             </a:solidFill>
@@ -6530,7 +6557,7 @@
                             <a:ea typeface="宋体" panose="02010600030101010101" pitchFamily="2" charset="-122"/>
                             <a:cs typeface="Times New Roman" panose="02020603050405020304" pitchFamily="18" charset="0"/>
                           </a:rPr>
-                          <m:t>𝜖</m:t>
+                          <m:t>ε</m:t>
                         </m:r>
                       </m:e>
                       <m:sub>
@@ -6573,7 +6600,10 @@
                       </m:sSubPr>
                       <m:e>
                         <m:r>
-                          <a:rPr lang="en-US" altLang="zh-CN" sz="2500" i="1" kern="100">
+                          <m:rPr>
+                            <m:sty m:val="p"/>
+                          </m:rPr>
+                          <a:rPr lang="el-GR" altLang="zh-CN" sz="2500" i="1" kern="100" smtClean="0">
                             <a:solidFill>
                               <a:schemeClr val="tx1"/>
                             </a:solidFill>
@@ -6581,7 +6611,7 @@
                             <a:ea typeface="宋体" panose="02010600030101010101" pitchFamily="2" charset="-122"/>
                             <a:cs typeface="Times New Roman" panose="02020603050405020304" pitchFamily="18" charset="0"/>
                           </a:rPr>
-                          <m:t>𝜖</m:t>
+                          <m:t>ε</m:t>
                         </m:r>
                       </m:e>
                       <m:sub>
@@ -6613,7 +6643,10 @@
                       </m:sSubPr>
                       <m:e>
                         <m:r>
-                          <a:rPr lang="en-US" altLang="zh-CN" sz="2500" i="1" kern="100">
+                          <m:rPr>
+                            <m:sty m:val="p"/>
+                          </m:rPr>
+                          <a:rPr lang="el-GR" altLang="zh-CN" sz="2500" i="1" kern="100" smtClean="0">
                             <a:solidFill>
                               <a:schemeClr val="tx1"/>
                             </a:solidFill>
@@ -6621,7 +6654,7 @@
                             <a:ea typeface="宋体" panose="02010600030101010101" pitchFamily="2" charset="-122"/>
                             <a:cs typeface="Times New Roman" panose="02020603050405020304" pitchFamily="18" charset="0"/>
                           </a:rPr>
-                          <m:t>𝜖</m:t>
+                          <m:t>ε</m:t>
                         </m:r>
                       </m:e>
                       <m:sub>
@@ -6702,7 +6735,10 @@
                         </m:sSubPr>
                         <m:e>
                           <m:r>
-                            <a:rPr lang="en-US" altLang="zh-CN" sz="2500" i="1" kern="100">
+                            <m:rPr>
+                              <m:sty m:val="p"/>
+                            </m:rPr>
+                            <a:rPr lang="el-GR" altLang="zh-CN" sz="2500" i="1" kern="100" smtClean="0">
                               <a:solidFill>
                                 <a:schemeClr val="tx1"/>
                               </a:solidFill>
@@ -6710,7 +6746,7 @@
                               <a:ea typeface="宋体" panose="02010600030101010101" pitchFamily="2" charset="-122"/>
                               <a:cs typeface="Times New Roman" panose="02020603050405020304" pitchFamily="18" charset="0"/>
                             </a:rPr>
-                            <m:t>𝜖</m:t>
+                            <m:t>ε</m:t>
                           </m:r>
                         </m:e>
                         <m:sub>
@@ -6780,7 +6816,10 @@
                             </m:sSubPr>
                             <m:e>
                               <m:r>
-                                <a:rPr lang="en-US" altLang="zh-CN" sz="2500" i="1" kern="100">
+                                <m:rPr>
+                                  <m:sty m:val="p"/>
+                                </m:rPr>
+                                <a:rPr lang="el-GR" altLang="zh-CN" sz="2500" i="1" kern="100" smtClean="0">
                                   <a:solidFill>
                                     <a:schemeClr val="tx1"/>
                                   </a:solidFill>
@@ -6788,7 +6827,7 @@
                                   <a:ea typeface="宋体" panose="02010600030101010101" pitchFamily="2" charset="-122"/>
                                   <a:cs typeface="Times New Roman" panose="02020603050405020304" pitchFamily="18" charset="0"/>
                                 </a:rPr>
-                                <m:t>𝜖</m:t>
+                                <m:t>ε</m:t>
                               </m:r>
                             </m:e>
                             <m:sub>
@@ -6979,7 +7018,10 @@
                                 </m:sSubPr>
                                 <m:e>
                                   <m:r>
-                                    <a:rPr lang="en-US" altLang="zh-CN" sz="2500" i="1" kern="100">
+                                    <m:rPr>
+                                      <m:sty m:val="p"/>
+                                    </m:rPr>
+                                    <a:rPr lang="el-GR" altLang="zh-CN" sz="2500" i="1" kern="100" smtClean="0">
                                       <a:solidFill>
                                         <a:schemeClr val="tx1"/>
                                       </a:solidFill>
@@ -6987,7 +7029,7 @@
                                       <a:ea typeface="宋体" panose="02010600030101010101" pitchFamily="2" charset="-122"/>
                                       <a:cs typeface="Times New Roman" panose="02020603050405020304" pitchFamily="18" charset="0"/>
                                     </a:rPr>
-                                    <m:t>𝜖</m:t>
+                                    <m:t>ε</m:t>
                                   </m:r>
                                 </m:e>
                                 <m:sub>
@@ -7745,7 +7787,10 @@
                       </m:sSubPr>
                       <m:e>
                         <m:r>
-                          <a:rPr lang="en-US" altLang="zh-CN" sz="2500" i="1" kern="100">
+                          <m:rPr>
+                            <m:sty m:val="p"/>
+                          </m:rPr>
+                          <a:rPr lang="el-GR" altLang="zh-CN" sz="2500" i="1" kern="100" smtClean="0">
                             <a:solidFill>
                               <a:schemeClr val="tx1"/>
                             </a:solidFill>
@@ -7753,7 +7798,7 @@
                             <a:ea typeface="宋体" panose="02010600030101010101" pitchFamily="2" charset="-122"/>
                             <a:cs typeface="Times New Roman" panose="02020603050405020304" pitchFamily="18" charset="0"/>
                           </a:rPr>
-                          <m:t>𝜖</m:t>
+                          <m:t>ε</m:t>
                         </m:r>
                       </m:e>
                       <m:sub>
@@ -8099,7 +8144,7 @@
             </p:txBody>
           </p:sp>
         </mc:Choice>
-        <mc:Fallback xmlns="">
+        <mc:Fallback>
           <p:sp>
             <p:nvSpPr>
               <p:cNvPr id="3" name="内容占位符 2">
@@ -8665,8 +8710,8 @@
           </a:p>
         </p:txBody>
       </p:sp>
-      <mc:AlternateContent xmlns:mc="http://schemas.openxmlformats.org/markup-compatibility/2006">
-        <mc:Choice xmlns:a14="http://schemas.microsoft.com/office/drawing/2010/main" Requires="a14">
+      <mc:AlternateContent xmlns:mc="http://schemas.openxmlformats.org/markup-compatibility/2006" xmlns:a14="http://schemas.microsoft.com/office/drawing/2010/main">
+        <mc:Choice Requires="a14">
           <p:sp>
             <p:nvSpPr>
               <p:cNvPr id="4" name="内容占位符 3">
@@ -9874,7 +9919,7 @@
             </p:txBody>
           </p:sp>
         </mc:Choice>
-        <mc:Fallback>
+        <mc:Fallback xmlns="">
           <p:sp>
             <p:nvSpPr>
               <p:cNvPr id="4" name="内容占位符 3">

</xml_diff>